<commit_message>
sync model nearly done and sync poc done
</commit_message>
<xml_diff>
--- a/Docs/design/Wireframes.pptx
+++ b/Docs/design/Wireframes.pptx
@@ -2997,16 +2997,16 @@
           </a:fontRef>
         </p:style>
         <p:txBody>
-          <a:bodyPr>
+          <a:bodyPr anchor="ctr">
             <a:normAutofit/>
           </a:bodyPr>
           <a:lstStyle/>
           <a:p>
             <a:r>
-              <a:rPr lang="fr-FR" dirty="0" err="1" smtClean="0"/>
+              <a:rPr lang="fr-FR" sz="1800" dirty="0" err="1" smtClean="0"/>
               <a:t>Arena</a:t>
             </a:r>
-            <a:endParaRPr lang="fr-FR" dirty="0"/>
+            <a:endParaRPr lang="fr-FR" sz="1800" dirty="0"/>
           </a:p>
         </p:txBody>
       </p:sp>
@@ -3041,7 +3041,7 @@
           </a:fontRef>
         </p:style>
         <p:txBody>
-          <a:bodyPr/>
+          <a:bodyPr anchor="ctr"/>
           <a:lstStyle/>
           <a:p>
             <a:r>
@@ -3084,7 +3084,7 @@
           </a:fontRef>
         </p:style>
         <p:txBody>
-          <a:bodyPr vert="horz" lIns="91440" tIns="45720" rIns="91440" bIns="45720" rtlCol="0" anchor="b">
+          <a:bodyPr vert="horz" lIns="91440" tIns="45720" rIns="91440" bIns="45720" rtlCol="0" anchor="ctr">
             <a:normAutofit fontScale="40000" lnSpcReduction="20000"/>
           </a:bodyPr>
           <a:lstStyle>
@@ -3110,6 +3110,214 @@
             <a:r>
               <a:rPr lang="fr-FR" dirty="0" smtClean="0"/>
               <a:t>Menu</a:t>
+            </a:r>
+            <a:endParaRPr lang="fr-FR" dirty="0"/>
+          </a:p>
+        </p:txBody>
+      </p:sp>
+      <p:sp>
+        <p:nvSpPr>
+          <p:cNvPr id="5" name="Subtitle 2"/>
+          <p:cNvSpPr txBox="1">
+            <a:spLocks/>
+          </p:cNvSpPr>
+          <p:nvPr/>
+        </p:nvSpPr>
+        <p:spPr>
+          <a:xfrm>
+            <a:off x="0" y="2155371"/>
+            <a:ext cx="6858000" cy="642257"/>
+          </a:xfrm>
+          <a:prstGeom prst="rect">
+            <a:avLst/>
+          </a:prstGeom>
+        </p:spPr>
+        <p:style>
+          <a:lnRef idx="2">
+            <a:schemeClr val="dk1"/>
+          </a:lnRef>
+          <a:fillRef idx="1">
+            <a:schemeClr val="lt1"/>
+          </a:fillRef>
+          <a:effectRef idx="0">
+            <a:schemeClr val="dk1"/>
+          </a:effectRef>
+          <a:fontRef idx="minor">
+            <a:schemeClr val="dk1"/>
+          </a:fontRef>
+        </p:style>
+        <p:txBody>
+          <a:bodyPr vert="horz" lIns="91440" tIns="45720" rIns="91440" bIns="45720" rtlCol="0" anchor="ctr">
+            <a:normAutofit/>
+          </a:bodyPr>
+          <a:lstStyle>
+            <a:lvl1pPr marL="0" indent="0" algn="ctr" defTabSz="685800" rtl="0" eaLnBrk="1" latinLnBrk="0" hangingPunct="1">
+              <a:lnSpc>
+                <a:spcPct val="90000"/>
+              </a:lnSpc>
+              <a:spcBef>
+                <a:spcPts val="750"/>
+              </a:spcBef>
+              <a:buFont typeface="Arial" panose="020B0604020202020204" pitchFamily="34" charset="0"/>
+              <a:buNone/>
+              <a:defRPr sz="1800" kern="1200">
+                <a:solidFill>
+                  <a:schemeClr val="dk1"/>
+                </a:solidFill>
+                <a:latin typeface="+mn-lt"/>
+                <a:ea typeface="+mn-ea"/>
+                <a:cs typeface="+mn-cs"/>
+              </a:defRPr>
+            </a:lvl1pPr>
+            <a:lvl2pPr marL="342900" indent="0" algn="ctr" defTabSz="685800" rtl="0" eaLnBrk="1" latinLnBrk="0" hangingPunct="1">
+              <a:lnSpc>
+                <a:spcPct val="90000"/>
+              </a:lnSpc>
+              <a:spcBef>
+                <a:spcPts val="375"/>
+              </a:spcBef>
+              <a:buFont typeface="Arial" panose="020B0604020202020204" pitchFamily="34" charset="0"/>
+              <a:buNone/>
+              <a:defRPr sz="1500" kern="1200">
+                <a:solidFill>
+                  <a:schemeClr val="dk1"/>
+                </a:solidFill>
+                <a:latin typeface="+mn-lt"/>
+                <a:ea typeface="+mn-ea"/>
+                <a:cs typeface="+mn-cs"/>
+              </a:defRPr>
+            </a:lvl2pPr>
+            <a:lvl3pPr marL="685800" indent="0" algn="ctr" defTabSz="685800" rtl="0" eaLnBrk="1" latinLnBrk="0" hangingPunct="1">
+              <a:lnSpc>
+                <a:spcPct val="90000"/>
+              </a:lnSpc>
+              <a:spcBef>
+                <a:spcPts val="375"/>
+              </a:spcBef>
+              <a:buFont typeface="Arial" panose="020B0604020202020204" pitchFamily="34" charset="0"/>
+              <a:buNone/>
+              <a:defRPr sz="1350" kern="1200">
+                <a:solidFill>
+                  <a:schemeClr val="dk1"/>
+                </a:solidFill>
+                <a:latin typeface="+mn-lt"/>
+                <a:ea typeface="+mn-ea"/>
+                <a:cs typeface="+mn-cs"/>
+              </a:defRPr>
+            </a:lvl3pPr>
+            <a:lvl4pPr marL="1028700" indent="0" algn="ctr" defTabSz="685800" rtl="0" eaLnBrk="1" latinLnBrk="0" hangingPunct="1">
+              <a:lnSpc>
+                <a:spcPct val="90000"/>
+              </a:lnSpc>
+              <a:spcBef>
+                <a:spcPts val="375"/>
+              </a:spcBef>
+              <a:buFont typeface="Arial" panose="020B0604020202020204" pitchFamily="34" charset="0"/>
+              <a:buNone/>
+              <a:defRPr sz="1200" kern="1200">
+                <a:solidFill>
+                  <a:schemeClr val="dk1"/>
+                </a:solidFill>
+                <a:latin typeface="+mn-lt"/>
+                <a:ea typeface="+mn-ea"/>
+                <a:cs typeface="+mn-cs"/>
+              </a:defRPr>
+            </a:lvl4pPr>
+            <a:lvl5pPr marL="1371600" indent="0" algn="ctr" defTabSz="685800" rtl="0" eaLnBrk="1" latinLnBrk="0" hangingPunct="1">
+              <a:lnSpc>
+                <a:spcPct val="90000"/>
+              </a:lnSpc>
+              <a:spcBef>
+                <a:spcPts val="375"/>
+              </a:spcBef>
+              <a:buFont typeface="Arial" panose="020B0604020202020204" pitchFamily="34" charset="0"/>
+              <a:buNone/>
+              <a:defRPr sz="1200" kern="1200">
+                <a:solidFill>
+                  <a:schemeClr val="dk1"/>
+                </a:solidFill>
+                <a:latin typeface="+mn-lt"/>
+                <a:ea typeface="+mn-ea"/>
+                <a:cs typeface="+mn-cs"/>
+              </a:defRPr>
+            </a:lvl5pPr>
+            <a:lvl6pPr marL="1714500" indent="0" algn="ctr" defTabSz="685800" rtl="0" eaLnBrk="1" latinLnBrk="0" hangingPunct="1">
+              <a:lnSpc>
+                <a:spcPct val="90000"/>
+              </a:lnSpc>
+              <a:spcBef>
+                <a:spcPts val="375"/>
+              </a:spcBef>
+              <a:buFont typeface="Arial" panose="020B0604020202020204" pitchFamily="34" charset="0"/>
+              <a:buNone/>
+              <a:defRPr sz="1200" kern="1200">
+                <a:solidFill>
+                  <a:schemeClr val="dk1"/>
+                </a:solidFill>
+                <a:latin typeface="+mn-lt"/>
+                <a:ea typeface="+mn-ea"/>
+                <a:cs typeface="+mn-cs"/>
+              </a:defRPr>
+            </a:lvl6pPr>
+            <a:lvl7pPr marL="2057400" indent="0" algn="ctr" defTabSz="685800" rtl="0" eaLnBrk="1" latinLnBrk="0" hangingPunct="1">
+              <a:lnSpc>
+                <a:spcPct val="90000"/>
+              </a:lnSpc>
+              <a:spcBef>
+                <a:spcPts val="375"/>
+              </a:spcBef>
+              <a:buFont typeface="Arial" panose="020B0604020202020204" pitchFamily="34" charset="0"/>
+              <a:buNone/>
+              <a:defRPr sz="1200" kern="1200">
+                <a:solidFill>
+                  <a:schemeClr val="dk1"/>
+                </a:solidFill>
+                <a:latin typeface="+mn-lt"/>
+                <a:ea typeface="+mn-ea"/>
+                <a:cs typeface="+mn-cs"/>
+              </a:defRPr>
+            </a:lvl7pPr>
+            <a:lvl8pPr marL="2400300" indent="0" algn="ctr" defTabSz="685800" rtl="0" eaLnBrk="1" latinLnBrk="0" hangingPunct="1">
+              <a:lnSpc>
+                <a:spcPct val="90000"/>
+              </a:lnSpc>
+              <a:spcBef>
+                <a:spcPts val="375"/>
+              </a:spcBef>
+              <a:buFont typeface="Arial" panose="020B0604020202020204" pitchFamily="34" charset="0"/>
+              <a:buNone/>
+              <a:defRPr sz="1200" kern="1200">
+                <a:solidFill>
+                  <a:schemeClr val="dk1"/>
+                </a:solidFill>
+                <a:latin typeface="+mn-lt"/>
+                <a:ea typeface="+mn-ea"/>
+                <a:cs typeface="+mn-cs"/>
+              </a:defRPr>
+            </a:lvl8pPr>
+            <a:lvl9pPr marL="2743200" indent="0" algn="ctr" defTabSz="685800" rtl="0" eaLnBrk="1" latinLnBrk="0" hangingPunct="1">
+              <a:lnSpc>
+                <a:spcPct val="90000"/>
+              </a:lnSpc>
+              <a:spcBef>
+                <a:spcPts val="375"/>
+              </a:spcBef>
+              <a:buFont typeface="Arial" panose="020B0604020202020204" pitchFamily="34" charset="0"/>
+              <a:buNone/>
+              <a:defRPr sz="1200" kern="1200">
+                <a:solidFill>
+                  <a:schemeClr val="dk1"/>
+                </a:solidFill>
+                <a:latin typeface="+mn-lt"/>
+                <a:ea typeface="+mn-ea"/>
+                <a:cs typeface="+mn-cs"/>
+              </a:defRPr>
+            </a:lvl9pPr>
+          </a:lstStyle>
+          <a:p>
+            <a:r>
+              <a:rPr lang="fr-FR" dirty="0" smtClean="0"/>
+              <a:t>JS – CA - </a:t>
             </a:r>
             <a:endParaRPr lang="fr-FR" dirty="0"/>
           </a:p>

</xml_diff>